<commit_message>
Added last part in the poster
</commit_message>
<xml_diff>
--- a/Final Poster.pptx
+++ b/Final Poster.pptx
@@ -1147,11 +1147,11 @@
         </c:dLbls>
         <c:gapWidth val="100"/>
         <c:overlap val="-24"/>
-        <c:axId val="215315832"/>
-        <c:axId val="215311128"/>
+        <c:axId val="332897904"/>
+        <c:axId val="332898296"/>
       </c:barChart>
       <c:catAx>
-        <c:axId val="215315832"/>
+        <c:axId val="332897904"/>
         <c:scaling>
           <c:orientation val="minMax"/>
         </c:scaling>
@@ -1250,7 +1250,7 @@
             <a:endParaRPr lang="en-US"/>
           </a:p>
         </c:txPr>
-        <c:crossAx val="215311128"/>
+        <c:crossAx val="332898296"/>
         <c:crosses val="autoZero"/>
         <c:auto val="1"/>
         <c:lblAlgn val="ctr"/>
@@ -1258,7 +1258,7 @@
         <c:noMultiLvlLbl val="0"/>
       </c:catAx>
       <c:valAx>
-        <c:axId val="215311128"/>
+        <c:axId val="332898296"/>
         <c:scaling>
           <c:orientation val="minMax"/>
         </c:scaling>
@@ -1361,7 +1361,7 @@
             <a:endParaRPr lang="en-US"/>
           </a:p>
         </c:txPr>
-        <c:crossAx val="215315832"/>
+        <c:crossAx val="332897904"/>
         <c:crosses val="autoZero"/>
         <c:crossBetween val="between"/>
       </c:valAx>
@@ -2120,7 +2120,7 @@
             <a:fld id="{1D8BD707-D9CF-40AE-B4C6-C98DA3205C09}" type="datetimeFigureOut">
               <a:rPr lang="en-US" smtClean="0"/>
               <a:pPr/>
-              <a:t>12/8/2015</a:t>
+              <a:t>12/9/2015</a:t>
             </a:fld>
             <a:endParaRPr lang="en-US"/>
           </a:p>
@@ -2287,7 +2287,7 @@
             <a:fld id="{1D8BD707-D9CF-40AE-B4C6-C98DA3205C09}" type="datetimeFigureOut">
               <a:rPr lang="en-US" smtClean="0"/>
               <a:pPr/>
-              <a:t>12/8/2015</a:t>
+              <a:t>12/9/2015</a:t>
             </a:fld>
             <a:endParaRPr lang="en-US"/>
           </a:p>
@@ -2464,7 +2464,7 @@
             <a:fld id="{1D8BD707-D9CF-40AE-B4C6-C98DA3205C09}" type="datetimeFigureOut">
               <a:rPr lang="en-US" smtClean="0"/>
               <a:pPr/>
-              <a:t>12/8/2015</a:t>
+              <a:t>12/9/2015</a:t>
             </a:fld>
             <a:endParaRPr lang="en-US"/>
           </a:p>
@@ -2631,7 +2631,7 @@
             <a:fld id="{1D8BD707-D9CF-40AE-B4C6-C98DA3205C09}" type="datetimeFigureOut">
               <a:rPr lang="en-US" smtClean="0"/>
               <a:pPr/>
-              <a:t>12/8/2015</a:t>
+              <a:t>12/9/2015</a:t>
             </a:fld>
             <a:endParaRPr lang="en-US"/>
           </a:p>
@@ -2874,7 +2874,7 @@
             <a:fld id="{1D8BD707-D9CF-40AE-B4C6-C98DA3205C09}" type="datetimeFigureOut">
               <a:rPr lang="en-US" smtClean="0"/>
               <a:pPr/>
-              <a:t>12/8/2015</a:t>
+              <a:t>12/9/2015</a:t>
             </a:fld>
             <a:endParaRPr lang="en-US"/>
           </a:p>
@@ -3159,7 +3159,7 @@
             <a:fld id="{1D8BD707-D9CF-40AE-B4C6-C98DA3205C09}" type="datetimeFigureOut">
               <a:rPr lang="en-US" smtClean="0"/>
               <a:pPr/>
-              <a:t>12/8/2015</a:t>
+              <a:t>12/9/2015</a:t>
             </a:fld>
             <a:endParaRPr lang="en-US"/>
           </a:p>
@@ -3578,7 +3578,7 @@
             <a:fld id="{1D8BD707-D9CF-40AE-B4C6-C98DA3205C09}" type="datetimeFigureOut">
               <a:rPr lang="en-US" smtClean="0"/>
               <a:pPr/>
-              <a:t>12/8/2015</a:t>
+              <a:t>12/9/2015</a:t>
             </a:fld>
             <a:endParaRPr lang="en-US"/>
           </a:p>
@@ -3693,7 +3693,7 @@
             <a:fld id="{1D8BD707-D9CF-40AE-B4C6-C98DA3205C09}" type="datetimeFigureOut">
               <a:rPr lang="en-US" smtClean="0"/>
               <a:pPr/>
-              <a:t>12/8/2015</a:t>
+              <a:t>12/9/2015</a:t>
             </a:fld>
             <a:endParaRPr lang="en-US"/>
           </a:p>
@@ -3785,7 +3785,7 @@
             <a:fld id="{1D8BD707-D9CF-40AE-B4C6-C98DA3205C09}" type="datetimeFigureOut">
               <a:rPr lang="en-US" smtClean="0"/>
               <a:pPr/>
-              <a:t>12/8/2015</a:t>
+              <a:t>12/9/2015</a:t>
             </a:fld>
             <a:endParaRPr lang="en-US"/>
           </a:p>
@@ -4059,7 +4059,7 @@
             <a:fld id="{1D8BD707-D9CF-40AE-B4C6-C98DA3205C09}" type="datetimeFigureOut">
               <a:rPr lang="en-US" smtClean="0"/>
               <a:pPr/>
-              <a:t>12/8/2015</a:t>
+              <a:t>12/9/2015</a:t>
             </a:fld>
             <a:endParaRPr lang="en-US"/>
           </a:p>
@@ -4309,7 +4309,7 @@
             <a:fld id="{1D8BD707-D9CF-40AE-B4C6-C98DA3205C09}" type="datetimeFigureOut">
               <a:rPr lang="en-US" smtClean="0"/>
               <a:pPr/>
-              <a:t>12/8/2015</a:t>
+              <a:t>12/9/2015</a:t>
             </a:fld>
             <a:endParaRPr lang="en-US"/>
           </a:p>
@@ -4519,7 +4519,7 @@
             <a:fld id="{1D8BD707-D9CF-40AE-B4C6-C98DA3205C09}" type="datetimeFigureOut">
               <a:rPr lang="en-US" smtClean="0"/>
               <a:pPr/>
-              <a:t>12/8/2015</a:t>
+              <a:t>12/9/2015</a:t>
             </a:fld>
             <a:endParaRPr lang="en-US"/>
           </a:p>
@@ -5496,15 +5496,7 @@
           <a:p>
             <a:r>
               <a:rPr lang="en-US" sz="4000" dirty="0" smtClean="0"/>
-              <a:t>How are images classified and </a:t>
-            </a:r>
-            <a:r>
-              <a:rPr lang="en-US" sz="4000" dirty="0" smtClean="0"/>
-              <a:t>what </a:t>
-            </a:r>
-            <a:r>
-              <a:rPr lang="en-US" sz="4000" dirty="0" smtClean="0"/>
-              <a:t>tools and machine learning algorithms would help make an accurate Image classifier?</a:t>
+              <a:t>How are images classified and what tools and machine learning algorithms would help make an accurate Image classifier?</a:t>
             </a:r>
             <a:endParaRPr lang="en-US" sz="4000" dirty="0"/>
           </a:p>
@@ -5783,7 +5775,7 @@
         <p:spPr>
           <a:xfrm>
             <a:off x="16713790" y="7127617"/>
-            <a:ext cx="10593140" cy="9941183"/>
+            <a:ext cx="10593140" cy="17943374"/>
           </a:xfrm>
           <a:prstGeom prst="rect">
             <a:avLst/>
@@ -5887,6 +5879,48 @@
             <a:r>
               <a:rPr lang="en-US" sz="4000" dirty="0" smtClean="0"/>
               <a:t>.</a:t>
+            </a:r>
+          </a:p>
+          <a:p>
+            <a:pPr defTabSz="914400">
+              <a:defRPr/>
+            </a:pPr>
+            <a:endParaRPr lang="en-US" sz="4000" dirty="0"/>
+          </a:p>
+          <a:p>
+            <a:pPr defTabSz="914400">
+              <a:defRPr/>
+            </a:pPr>
+            <a:r>
+              <a:rPr lang="en-US" sz="4000" dirty="0" smtClean="0"/>
+              <a:t>The clustered layer generated by </a:t>
+            </a:r>
+            <a:r>
+              <a:rPr lang="en-US" sz="4000" dirty="0" err="1" smtClean="0"/>
+              <a:t>Dbscan</a:t>
+            </a:r>
+            <a:r>
+              <a:rPr lang="en-US" sz="4000" dirty="0" smtClean="0"/>
+              <a:t> is then used to generate a set of feature vectors (1-D vector of numerical values that represent the layer).  Following this, the feature vectors ar</a:t>
+            </a:r>
+            <a:r>
+              <a:rPr lang="en-US" sz="4000" dirty="0" smtClean="0"/>
+              <a:t>e used to create a machine learning SVM (Support Vector Machine) model. The model is then further used to predict what a given image contains.</a:t>
+            </a:r>
+          </a:p>
+          <a:p>
+            <a:pPr defTabSz="914400">
+              <a:defRPr/>
+            </a:pPr>
+            <a:endParaRPr lang="en-US" sz="4000" dirty="0"/>
+          </a:p>
+          <a:p>
+            <a:pPr defTabSz="914400">
+              <a:defRPr/>
+            </a:pPr>
+            <a:r>
+              <a:rPr lang="en-US" sz="4000" dirty="0" smtClean="0"/>
+              <a:t>The results are in the form of a list of tags and the associated probabilities for each image provided to the model.</a:t>
             </a:r>
             <a:endParaRPr lang="en-US" sz="4000" dirty="0"/>
           </a:p>
@@ -6361,11 +6395,7 @@
           <a:p>
             <a:r>
               <a:rPr lang="en-US" sz="4000" dirty="0" smtClean="0"/>
-              <a:t>This is attributed to the feature vector. The usage of a different feature vector would yield different accuracy results</a:t>
-            </a:r>
-            <a:r>
-              <a:rPr lang="en-US" sz="4000" dirty="0" smtClean="0"/>
-              <a:t>.</a:t>
+              <a:t>This is attributed to the feature vector. The usage of a different feature vector would yield different accuracy results.</a:t>
             </a:r>
             <a:endParaRPr lang="en-US" sz="4000" dirty="0"/>
           </a:p>
@@ -6377,7 +6407,6 @@
               <a:rPr lang="en-US" sz="4000" dirty="0" smtClean="0"/>
               <a:t>Another factor is the amount of data used for training. Using more number of images which are also diverse in their content would yield more accurate results.</a:t>
             </a:r>
-            <a:endParaRPr lang="en-US" sz="4000" dirty="0" smtClean="0"/>
           </a:p>
         </p:txBody>
       </p:sp>

</xml_diff>